<commit_message>
admin log in added after contact, Qian can talk that too I guess
</commit_message>
<xml_diff>
--- a/presentation/!_Easy_Move_PHP_DFR.pptx
+++ b/presentation/!_Easy_Move_PHP_DFR.pptx
@@ -5,7 +5,7 @@
     <p:sldMasterId id="2147483684" r:id="rId1"/>
   </p:sldMasterIdLst>
   <p:notesMasterIdLst>
-    <p:notesMasterId r:id="rId18"/>
+    <p:notesMasterId r:id="rId19"/>
   </p:notesMasterIdLst>
   <p:sldIdLst>
     <p:sldId id="272" r:id="rId2"/>
@@ -22,8 +22,9 @@
     <p:sldId id="294" r:id="rId13"/>
     <p:sldId id="295" r:id="rId14"/>
     <p:sldId id="296" r:id="rId15"/>
-    <p:sldId id="297" r:id="rId16"/>
-    <p:sldId id="298" r:id="rId17"/>
+    <p:sldId id="300" r:id="rId16"/>
+    <p:sldId id="297" r:id="rId17"/>
+    <p:sldId id="298" r:id="rId18"/>
   </p:sldIdLst>
   <p:sldSz cx="12192000" cy="6858000"/>
   <p:notesSz cx="7315200" cy="9601200"/>
@@ -212,7 +213,7 @@
           <a:p>
             <a:fld id="{71BD4573-58E7-4156-A133-2731F5F8D1A6}" type="datetimeFigureOut">
               <a:rPr lang="en-US" smtClean="0"/>
-              <a:t>2018-05-01</a:t>
+              <a:t>5/1/2018</a:t>
             </a:fld>
             <a:endParaRPr lang="en-US"/>
           </a:p>
@@ -877,7 +878,7 @@
           <a:p>
             <a:fld id="{021A1D30-C0A0-4124-A783-34D9F15FA0FE}" type="datetime1">
               <a:rPr lang="en-US" smtClean="0"/>
-              <a:t>2018-05-01</a:t>
+              <a:t>5/1/2018</a:t>
             </a:fld>
             <a:endParaRPr lang="en-US"/>
           </a:p>
@@ -1061,7 +1062,7 @@
           <a:p>
             <a:fld id="{8D2D5871-AB0F-4B3D-8861-97E78CB7B47E}" type="datetime1">
               <a:rPr lang="en-US" smtClean="0"/>
-              <a:t>2018-05-01</a:t>
+              <a:t>5/1/2018</a:t>
             </a:fld>
             <a:endParaRPr lang="en-US"/>
           </a:p>
@@ -1255,7 +1256,7 @@
           <a:p>
             <a:fld id="{14418406-4C3F-4F3E-80BD-A22568EA37EB}" type="datetime1">
               <a:rPr lang="en-US" smtClean="0"/>
-              <a:t>2018-05-01</a:t>
+              <a:t>5/1/2018</a:t>
             </a:fld>
             <a:endParaRPr lang="en-US"/>
           </a:p>
@@ -1439,7 +1440,7 @@
           <a:p>
             <a:fld id="{65F28077-7188-48C5-8679-2287FAC952E9}" type="datetime1">
               <a:rPr lang="en-US" smtClean="0"/>
-              <a:t>2018-05-01</a:t>
+              <a:t>5/1/2018</a:t>
             </a:fld>
             <a:endParaRPr lang="en-US"/>
           </a:p>
@@ -1686,7 +1687,7 @@
           <a:p>
             <a:fld id="{D2DCB740-6776-4EE9-99FD-96D592FA5A23}" type="datetime1">
               <a:rPr lang="en-US" smtClean="0"/>
-              <a:t>2018-05-01</a:t>
+              <a:t>5/1/2018</a:t>
             </a:fld>
             <a:endParaRPr lang="en-US"/>
           </a:p>
@@ -1969,7 +1970,7 @@
           <a:p>
             <a:fld id="{05F6BD99-6FFD-46C5-B5E2-43A34BDA2566}" type="datetime1">
               <a:rPr lang="en-US" smtClean="0"/>
-              <a:t>2018-05-01</a:t>
+              <a:t>5/1/2018</a:t>
             </a:fld>
             <a:endParaRPr lang="en-US"/>
           </a:p>
@@ -2366,7 +2367,7 @@
           <a:p>
             <a:fld id="{E022678E-214C-4CF8-97C7-95015FB02960}" type="datetime1">
               <a:rPr lang="en-US" smtClean="0"/>
-              <a:t>2018-05-01</a:t>
+              <a:t>5/1/2018</a:t>
             </a:fld>
             <a:endParaRPr lang="en-US"/>
           </a:p>
@@ -2535,7 +2536,7 @@
           <a:p>
             <a:fld id="{D55660E0-FA77-4473-A859-74127B089143}" type="datetime1">
               <a:rPr lang="en-US" smtClean="0"/>
-              <a:t>2018-05-01</a:t>
+              <a:t>5/1/2018</a:t>
             </a:fld>
             <a:endParaRPr lang="en-US"/>
           </a:p>
@@ -2645,7 +2646,7 @@
           <a:p>
             <a:fld id="{3188D7B8-9F07-4899-827D-5F3CFDDEB574}" type="datetime1">
               <a:rPr lang="en-US" smtClean="0"/>
-              <a:t>2018-05-01</a:t>
+              <a:t>5/1/2018</a:t>
             </a:fld>
             <a:endParaRPr lang="en-US"/>
           </a:p>
@@ -2925,7 +2926,7 @@
           <a:p>
             <a:fld id="{B5197C5C-1CD1-417D-A89C-14747F5222C7}" type="datetime1">
               <a:rPr lang="en-US" smtClean="0"/>
-              <a:t>2018-05-01</a:t>
+              <a:t>5/1/2018</a:t>
             </a:fld>
             <a:endParaRPr lang="en-US"/>
           </a:p>
@@ -3278,7 +3279,7 @@
           <a:p>
             <a:fld id="{1359EFBB-CFA1-4AA8-9123-F0B52DBD84FE}" type="datetime1">
               <a:rPr lang="en-US" smtClean="0"/>
-              <a:t>2018-05-01</a:t>
+              <a:t>5/1/2018</a:t>
             </a:fld>
             <a:endParaRPr lang="en-US"/>
           </a:p>
@@ -4312,7 +4313,7 @@
             <a:fld id="{61146459-E3C3-4969-9224-5ED50B492D17}" type="datetime1">
               <a:rPr lang="en-US" smtClean="0"/>
               <a:pPr/>
-              <a:t>2018-05-01</a:t>
+              <a:t>5/1/2018</a:t>
             </a:fld>
             <a:endParaRPr lang="en-US" dirty="0"/>
           </a:p>
@@ -4773,13 +4774,8 @@
             <a:pPr algn="l"/>
             <a:r>
               <a:rPr lang="en-US" sz="6000" dirty="0"/>
-              <a:t>Easy </a:t>
-            </a:r>
-            <a:r>
-              <a:rPr lang="en-US" sz="6000" dirty="0" smtClean="0"/>
-              <a:t>Move Website</a:t>
-            </a:r>
-            <a:endParaRPr lang="en-US" sz="6000" dirty="0"/>
+              <a:t>Easy Move Website</a:t>
+            </a:r>
           </a:p>
         </p:txBody>
       </p:sp>
@@ -4811,7 +4807,7 @@
               </a:lnSpc>
             </a:pPr>
             <a:r>
-              <a:rPr lang="en-CA" dirty="0" smtClean="0"/>
+              <a:rPr lang="en-CA" dirty="0"/>
               <a:t>PHP team project</a:t>
             </a:r>
           </a:p>
@@ -4823,15 +4819,7 @@
             </a:pPr>
             <a:r>
               <a:rPr lang="en-CA" dirty="0"/>
-              <a:t>b</a:t>
-            </a:r>
-            <a:r>
-              <a:rPr lang="en-CA" dirty="0" smtClean="0"/>
-              <a:t>y Roman </a:t>
-            </a:r>
-            <a:r>
-              <a:rPr lang="en-CA" dirty="0"/>
-              <a:t>Shaiko, Qian Gao, </a:t>
+              <a:t>by Roman Shaiko, Qian Gao, </a:t>
             </a:r>
             <a:r>
               <a:rPr lang="en-CA" dirty="0" err="1"/>
@@ -4906,13 +4894,6 @@
       </p:transition>
     </mc:Fallback>
   </mc:AlternateContent>
-  <p:timing>
-    <p:tnLst>
-      <p:par>
-        <p:cTn id="1" dur="indefinite" restart="never" nodeType="tmRoot"/>
-      </p:par>
-    </p:tnLst>
-  </p:timing>
 </p:sld>
 </file>
 
@@ -4973,12 +4954,8 @@
               </a:spcAft>
             </a:pPr>
             <a:r>
-              <a:rPr lang="en-US" sz="4000" b="1" dirty="0" smtClean="0"/>
-              <a:t>Dynamic </a:t>
-            </a:r>
-            <a:r>
               <a:rPr lang="en-US" sz="4000" b="1" dirty="0"/>
-              <a:t>calendar </a:t>
+              <a:t>Dynamic calendar </a:t>
             </a:r>
             <a:endParaRPr lang="en-US" sz="4000" dirty="0"/>
           </a:p>
@@ -5102,13 +5079,6 @@
       </p:transition>
     </mc:Fallback>
   </mc:AlternateContent>
-  <p:timing>
-    <p:tnLst>
-      <p:par>
-        <p:cTn id="1" dur="indefinite" restart="never" nodeType="tmRoot"/>
-      </p:par>
-    </p:tnLst>
-  </p:timing>
 </p:sld>
 </file>
 
@@ -5163,17 +5133,12 @@
             </a:r>
             <a:r>
               <a:rPr lang="en-US" sz="4000" b="1" dirty="0" err="1"/>
-              <a:t>F</a:t>
-            </a:r>
-            <a:r>
-              <a:rPr lang="en-US" sz="4000" b="1" dirty="0" err="1" smtClean="0"/>
-              <a:t>ullcalendar</a:t>
-            </a:r>
-            <a:r>
-              <a:rPr lang="en-US" sz="4000" b="1" dirty="0" smtClean="0"/>
+              <a:t>Fullcalendar</a:t>
+            </a:r>
+            <a:r>
+              <a:rPr lang="en-US" sz="4000" b="1" dirty="0"/>
               <a:t> plugin</a:t>
             </a:r>
-            <a:endParaRPr lang="en-US" sz="4000" b="1" dirty="0"/>
           </a:p>
         </p:txBody>
       </p:sp>
@@ -5241,13 +5206,6 @@
       </p:transition>
     </mc:Fallback>
   </mc:AlternateContent>
-  <p:timing>
-    <p:tnLst>
-      <p:par>
-        <p:cTn id="1" dur="indefinite" restart="never" nodeType="tmRoot"/>
-      </p:par>
-    </p:tnLst>
-  </p:timing>
 </p:sld>
 </file>
 
@@ -5298,13 +5256,8 @@
           <a:p>
             <a:r>
               <a:rPr lang="en-CA" b="1" dirty="0"/>
-              <a:t>C</a:t>
-            </a:r>
-            <a:r>
-              <a:rPr lang="en-CA" b="1" dirty="0" smtClean="0"/>
-              <a:t>alendar</a:t>
-            </a:r>
-            <a:endParaRPr lang="en-CA" b="1" dirty="0"/>
+              <a:t>Calendar</a:t>
+            </a:r>
           </a:p>
         </p:txBody>
       </p:sp>
@@ -5336,21 +5289,8 @@
           <a:p>
             <a:r>
               <a:rPr lang="en-CA" dirty="0"/>
-              <a:t>How to pass data fetched from database by </a:t>
-            </a:r>
-            <a:r>
-              <a:rPr lang="en-CA" dirty="0" smtClean="0"/>
-              <a:t>PHP </a:t>
-            </a:r>
-            <a:r>
-              <a:rPr lang="en-CA" dirty="0"/>
-              <a:t>to </a:t>
-            </a:r>
-            <a:r>
-              <a:rPr lang="en-CA" dirty="0" smtClean="0"/>
-              <a:t>JQuery script?</a:t>
-            </a:r>
-            <a:endParaRPr lang="en-CA" dirty="0"/>
+              <a:t>How to pass data fetched from database by PHP to JQuery script?</a:t>
+            </a:r>
           </a:p>
           <a:p>
             <a:r>
@@ -5425,13 +5365,6 @@
       </p:transition>
     </mc:Fallback>
   </mc:AlternateContent>
-  <p:timing>
-    <p:tnLst>
-      <p:par>
-        <p:cTn id="1" dur="indefinite" restart="never" nodeType="tmRoot"/>
-      </p:par>
-    </p:tnLst>
-  </p:timing>
 </p:sld>
 </file>
 
@@ -5557,13 +5490,6 @@
       </p:transition>
     </mc:Fallback>
   </mc:AlternateContent>
-  <p:timing>
-    <p:tnLst>
-      <p:par>
-        <p:cTn id="1" dur="indefinite" restart="never" nodeType="tmRoot"/>
-      </p:par>
-    </p:tnLst>
-  </p:timing>
 </p:sld>
 </file>
 
@@ -5614,21 +5540,8 @@
           <a:p>
             <a:r>
               <a:rPr lang="en-CA" sz="4000" b="1" dirty="0"/>
-              <a:t>Contact form </a:t>
-            </a:r>
-            <a:r>
-              <a:rPr lang="en-CA" sz="4000" b="1" dirty="0" smtClean="0"/>
-              <a:t>– </a:t>
-            </a:r>
-            <a:r>
-              <a:rPr lang="en-CA" sz="4000" b="1" dirty="0"/>
-              <a:t>validation by </a:t>
-            </a:r>
-            <a:r>
-              <a:rPr lang="en-CA" sz="4000" b="1" dirty="0" smtClean="0"/>
-              <a:t>Angular</a:t>
-            </a:r>
-            <a:endParaRPr lang="en-CA" sz="4000" b="1" dirty="0"/>
+              <a:t>Contact form – validation by Angular</a:t>
+            </a:r>
           </a:p>
         </p:txBody>
       </p:sp>
@@ -5659,12 +5572,8 @@
           <a:lstStyle/>
           <a:p>
             <a:r>
-              <a:rPr lang="en-CA" dirty="0" smtClean="0"/>
-              <a:t>HTML </a:t>
-            </a:r>
-            <a:r>
               <a:rPr lang="en-CA" dirty="0"/>
-              <a:t>mark up</a:t>
+              <a:t>HTML mark up</a:t>
             </a:r>
           </a:p>
           <a:p>
@@ -5677,25 +5586,16 @@
             <a:pPr marL="0" indent="0">
               <a:buNone/>
             </a:pPr>
-            <a:endParaRPr lang="en-CA" dirty="0" smtClean="0"/>
+            <a:endParaRPr lang="en-CA" dirty="0"/>
           </a:p>
           <a:p>
             <a:pPr marL="0" indent="0">
               <a:buNone/>
             </a:pPr>
             <a:r>
-              <a:rPr lang="en-CA" dirty="0" smtClean="0"/>
-              <a:t>Script </a:t>
-            </a:r>
-            <a:r>
               <a:rPr lang="en-CA" dirty="0"/>
-              <a:t>with </a:t>
-            </a:r>
-            <a:r>
-              <a:rPr lang="en-CA" dirty="0" smtClean="0"/>
-              <a:t>Angular</a:t>
-            </a:r>
-            <a:endParaRPr lang="en-CA" dirty="0"/>
+              <a:t>Script with Angular</a:t>
+            </a:r>
           </a:p>
           <a:p>
             <a:pPr marL="0" indent="0">
@@ -5806,13 +5706,6 @@
       </p:transition>
     </mc:Fallback>
   </mc:AlternateContent>
-  <p:timing>
-    <p:tnLst>
-      <p:par>
-        <p:cTn id="1" dur="indefinite" restart="never" nodeType="tmRoot"/>
-      </p:par>
-    </p:tnLst>
-  </p:timing>
 </p:sld>
 </file>
 
@@ -5838,6 +5731,212 @@
           <p:cNvPr id="2" name="Title 1">
             <a:extLst>
               <a:ext uri="{FF2B5EF4-FFF2-40B4-BE49-F238E27FC236}">
+                <a16:creationId xmlns:a16="http://schemas.microsoft.com/office/drawing/2014/main" id="{54FAD47F-204E-4A3F-BD08-88F03A560B3A}"/>
+              </a:ext>
+            </a:extLst>
+          </p:cNvPr>
+          <p:cNvSpPr>
+            <a:spLocks noGrp="1"/>
+          </p:cNvSpPr>
+          <p:nvPr>
+            <p:ph type="title"/>
+          </p:nvPr>
+        </p:nvSpPr>
+        <p:spPr>
+          <a:xfrm>
+            <a:off x="609600" y="704088"/>
+            <a:ext cx="10972800" cy="727147"/>
+          </a:xfrm>
+        </p:spPr>
+        <p:txBody>
+          <a:bodyPr>
+            <a:normAutofit/>
+          </a:bodyPr>
+          <a:lstStyle/>
+          <a:p>
+            <a:r>
+              <a:rPr lang="en-CA" sz="3600" dirty="0"/>
+              <a:t>Admin login page</a:t>
+            </a:r>
+          </a:p>
+        </p:txBody>
+      </p:sp>
+      <p:sp>
+        <p:nvSpPr>
+          <p:cNvPr id="4" name="Content Placeholder 3">
+            <a:extLst>
+              <a:ext uri="{FF2B5EF4-FFF2-40B4-BE49-F238E27FC236}">
+                <a16:creationId xmlns:a16="http://schemas.microsoft.com/office/drawing/2014/main" id="{CF4C309F-332A-4403-87D4-7FEC8E0B1C74}"/>
+              </a:ext>
+            </a:extLst>
+          </p:cNvPr>
+          <p:cNvSpPr>
+            <a:spLocks noGrp="1"/>
+          </p:cNvSpPr>
+          <p:nvPr>
+            <p:ph sz="half" idx="2"/>
+          </p:nvPr>
+        </p:nvSpPr>
+        <p:spPr>
+          <a:xfrm>
+            <a:off x="6197600" y="1920085"/>
+            <a:ext cx="5384800" cy="4434840"/>
+          </a:xfrm>
+        </p:spPr>
+        <p:txBody>
+          <a:bodyPr/>
+          <a:lstStyle/>
+          <a:p>
+            <a:r>
+              <a:rPr lang="en-CA" dirty="0"/>
+              <a:t>Redirect page to Admin section</a:t>
+            </a:r>
+          </a:p>
+          <a:p>
+            <a:endParaRPr lang="en-CA" dirty="0"/>
+          </a:p>
+        </p:txBody>
+      </p:sp>
+      <p:sp>
+        <p:nvSpPr>
+          <p:cNvPr id="7" name="Content Placeholder 6">
+            <a:extLst>
+              <a:ext uri="{FF2B5EF4-FFF2-40B4-BE49-F238E27FC236}">
+                <a16:creationId xmlns:a16="http://schemas.microsoft.com/office/drawing/2014/main" id="{CAF3A3BC-81C5-4CA4-8C88-BB7F259D5D11}"/>
+              </a:ext>
+            </a:extLst>
+          </p:cNvPr>
+          <p:cNvSpPr>
+            <a:spLocks noGrp="1"/>
+          </p:cNvSpPr>
+          <p:nvPr>
+            <p:ph sz="half" idx="1"/>
+          </p:nvPr>
+        </p:nvSpPr>
+        <p:spPr>
+          <a:xfrm>
+            <a:off x="609600" y="1920085"/>
+            <a:ext cx="5384800" cy="4434840"/>
+          </a:xfrm>
+        </p:spPr>
+        <p:txBody>
+          <a:bodyPr/>
+          <a:lstStyle/>
+          <a:p>
+            <a:r>
+              <a:rPr lang="en-CA" dirty="0"/>
+              <a:t>User authentication – verify information with database</a:t>
+            </a:r>
+          </a:p>
+        </p:txBody>
+      </p:sp>
+      <p:pic>
+        <p:nvPicPr>
+          <p:cNvPr id="8" name="Picture 7">
+            <a:extLst>
+              <a:ext uri="{FF2B5EF4-FFF2-40B4-BE49-F238E27FC236}">
+                <a16:creationId xmlns:a16="http://schemas.microsoft.com/office/drawing/2014/main" id="{53FB9E33-2BF9-49EF-A2DD-9C83B998E67E}"/>
+              </a:ext>
+            </a:extLst>
+          </p:cNvPr>
+          <p:cNvPicPr>
+            <a:picLocks noChangeAspect="1"/>
+          </p:cNvPicPr>
+          <p:nvPr/>
+        </p:nvPicPr>
+        <p:blipFill>
+          <a:blip r:embed="rId2"/>
+          <a:stretch>
+            <a:fillRect/>
+          </a:stretch>
+        </p:blipFill>
+        <p:spPr>
+          <a:xfrm>
+            <a:off x="973413" y="3024187"/>
+            <a:ext cx="3857625" cy="2638425"/>
+          </a:xfrm>
+          <a:prstGeom prst="rect">
+            <a:avLst/>
+          </a:prstGeom>
+        </p:spPr>
+      </p:pic>
+      <p:pic>
+        <p:nvPicPr>
+          <p:cNvPr id="9" name="Picture 8">
+            <a:extLst>
+              <a:ext uri="{FF2B5EF4-FFF2-40B4-BE49-F238E27FC236}">
+                <a16:creationId xmlns:a16="http://schemas.microsoft.com/office/drawing/2014/main" id="{E287D06C-EED6-454B-886B-72BB1361D2AC}"/>
+              </a:ext>
+            </a:extLst>
+          </p:cNvPr>
+          <p:cNvPicPr>
+            <a:picLocks noChangeAspect="1"/>
+          </p:cNvPicPr>
+          <p:nvPr/>
+        </p:nvPicPr>
+        <p:blipFill>
+          <a:blip r:embed="rId3"/>
+          <a:stretch>
+            <a:fillRect/>
+          </a:stretch>
+        </p:blipFill>
+        <p:spPr>
+          <a:xfrm>
+            <a:off x="6358213" y="3010426"/>
+            <a:ext cx="4143375" cy="2600325"/>
+          </a:xfrm>
+          <a:prstGeom prst="rect">
+            <a:avLst/>
+          </a:prstGeom>
+        </p:spPr>
+      </p:pic>
+    </p:spTree>
+    <p:extLst>
+      <p:ext uri="{BB962C8B-B14F-4D97-AF65-F5344CB8AC3E}">
+        <p14:creationId xmlns:p14="http://schemas.microsoft.com/office/powerpoint/2010/main" val="3511389429"/>
+      </p:ext>
+    </p:extLst>
+  </p:cSld>
+  <p:clrMapOvr>
+    <a:masterClrMapping/>
+  </p:clrMapOvr>
+  <mc:AlternateContent xmlns:mc="http://schemas.openxmlformats.org/markup-compatibility/2006" xmlns:p14="http://schemas.microsoft.com/office/powerpoint/2010/main">
+    <mc:Choice Requires="p14">
+      <p:transition spd="med" p14:dur="700">
+        <p:fade/>
+      </p:transition>
+    </mc:Choice>
+    <mc:Fallback xmlns="">
+      <p:transition spd="med">
+        <p:fade/>
+      </p:transition>
+    </mc:Fallback>
+  </mc:AlternateContent>
+</p:sld>
+</file>
+
+<file path=ppt/slides/slide16.xml><?xml version="1.0" encoding="utf-8"?>
+<p:sld xmlns:a="http://schemas.openxmlformats.org/drawingml/2006/main" xmlns:r="http://schemas.openxmlformats.org/officeDocument/2006/relationships" xmlns:p="http://schemas.openxmlformats.org/presentationml/2006/main">
+  <p:cSld>
+    <p:spTree>
+      <p:nvGrpSpPr>
+        <p:cNvPr id="1" name=""/>
+        <p:cNvGrpSpPr/>
+        <p:nvPr/>
+      </p:nvGrpSpPr>
+      <p:grpSpPr>
+        <a:xfrm>
+          <a:off x="0" y="0"/>
+          <a:ext cx="0" cy="0"/>
+          <a:chOff x="0" y="0"/>
+          <a:chExt cx="0" cy="0"/>
+        </a:xfrm>
+      </p:grpSpPr>
+      <p:sp>
+        <p:nvSpPr>
+          <p:cNvPr id="2" name="Title 1">
+            <a:extLst>
+              <a:ext uri="{FF2B5EF4-FFF2-40B4-BE49-F238E27FC236}">
                 <a16:creationId xmlns:a16="http://schemas.microsoft.com/office/drawing/2014/main" id="{A10C38A8-447D-4DBA-946B-ADB41B2DE67E}"/>
               </a:ext>
             </a:extLst>
@@ -5901,13 +6000,8 @@
             </a:pPr>
             <a:r>
               <a:rPr lang="en-CA" sz="2500" dirty="0"/>
-              <a:t>Complete all the web-pages French and </a:t>
-            </a:r>
-            <a:r>
-              <a:rPr lang="en-CA" sz="2500" dirty="0" smtClean="0"/>
-              <a:t>English</a:t>
-            </a:r>
-            <a:endParaRPr lang="en-CA" sz="2500" dirty="0"/>
+              <a:t>Complete all the web-pages French and English</a:t>
+            </a:r>
           </a:p>
           <a:p>
             <a:pPr>
@@ -5917,13 +6011,8 @@
             </a:pPr>
             <a:r>
               <a:rPr lang="en-CA" sz="2500" dirty="0"/>
-              <a:t>Enable user to schedule a moving </a:t>
-            </a:r>
-            <a:r>
-              <a:rPr lang="en-CA" sz="2500" dirty="0" smtClean="0"/>
-              <a:t>appointment</a:t>
-            </a:r>
-            <a:endParaRPr lang="en-CA" sz="2500" dirty="0"/>
+              <a:t>Enable user to schedule a moving appointment</a:t>
+            </a:r>
           </a:p>
           <a:p>
             <a:pPr>
@@ -5933,13 +6022,8 @@
             </a:pPr>
             <a:r>
               <a:rPr lang="en-CA" sz="2500" dirty="0"/>
-              <a:t>When an estimation request was submitted, user will get an </a:t>
-            </a:r>
-            <a:r>
-              <a:rPr lang="en-CA" sz="2500" dirty="0" smtClean="0"/>
-              <a:t>email</a:t>
-            </a:r>
-            <a:endParaRPr lang="en-CA" sz="2500" dirty="0"/>
+              <a:t>When an estimation request was submitted, user will get an email</a:t>
+            </a:r>
           </a:p>
           <a:p>
             <a:pPr>
@@ -5949,29 +6033,8 @@
             </a:pPr>
             <a:r>
               <a:rPr lang="en-CA" sz="2500" dirty="0"/>
-              <a:t>Implement site security </a:t>
-            </a:r>
-            <a:r>
-              <a:rPr lang="en-CA" sz="2500" dirty="0" smtClean="0"/>
-              <a:t>control: </a:t>
-            </a:r>
-            <a:r>
-              <a:rPr lang="en-CA" sz="2500" dirty="0"/>
-              <a:t>when form is </a:t>
-            </a:r>
-            <a:r>
-              <a:rPr lang="en-CA" sz="2500" dirty="0" smtClean="0"/>
-              <a:t>submitted</a:t>
-            </a:r>
-            <a:r>
-              <a:rPr lang="en-CA" sz="2500" dirty="0"/>
-              <a:t>, there need to be matched token from session and from the form hidden input tag of the </a:t>
-            </a:r>
-            <a:r>
-              <a:rPr lang="en-CA" sz="2500" dirty="0" smtClean="0"/>
-              <a:t>form</a:t>
-            </a:r>
-            <a:endParaRPr lang="en-CA" sz="2500" dirty="0"/>
+              <a:t>Implement site security control: when form is submitted, there need to be matched token from session and from the form hidden input tag of the form</a:t>
+            </a:r>
           </a:p>
           <a:p>
             <a:pPr>
@@ -6033,17 +6096,10 @@
       </p:transition>
     </mc:Fallback>
   </mc:AlternateContent>
-  <p:timing>
-    <p:tnLst>
-      <p:par>
-        <p:cTn id="1" dur="indefinite" restart="never" nodeType="tmRoot"/>
-      </p:par>
-    </p:tnLst>
-  </p:timing>
 </p:sld>
 </file>
 
-<file path=ppt/slides/slide16.xml><?xml version="1.0" encoding="utf-8"?>
+<file path=ppt/slides/slide17.xml><?xml version="1.0" encoding="utf-8"?>
 <p:sld xmlns:a="http://schemas.openxmlformats.org/drawingml/2006/main" xmlns:r="http://schemas.openxmlformats.org/officeDocument/2006/relationships" xmlns:p="http://schemas.openxmlformats.org/presentationml/2006/main">
   <p:cSld>
     <p:spTree>
@@ -6090,13 +6146,8 @@
           <a:p>
             <a:r>
               <a:rPr lang="en-CA" sz="4000" b="1" dirty="0"/>
-              <a:t>S</a:t>
-            </a:r>
-            <a:r>
-              <a:rPr lang="en-CA" sz="4000" b="1" dirty="0" smtClean="0"/>
-              <a:t>ummary</a:t>
-            </a:r>
-            <a:endParaRPr lang="en-CA" sz="4000" b="1" dirty="0"/>
+              <a:t>Summary</a:t>
+            </a:r>
           </a:p>
         </p:txBody>
       </p:sp>
@@ -6137,71 +6188,15 @@
             </a:pPr>
             <a:r>
               <a:rPr lang="en-CA" dirty="0"/>
-              <a:t>	</a:t>
-            </a:r>
-            <a:r>
-              <a:rPr lang="en-CA" dirty="0" smtClean="0"/>
-              <a:t>MySQL </a:t>
-            </a:r>
-            <a:r>
-              <a:rPr lang="en-CA" dirty="0" err="1" smtClean="0"/>
-              <a:t>Databse</a:t>
+              <a:t>	MySQL Database, PHP, CSS, JavaScript, JQuery, Angular, HTML, 	Bootstrap, </a:t>
+            </a:r>
+            <a:r>
+              <a:rPr lang="en-CA" dirty="0" err="1"/>
+              <a:t>Fullcalendar</a:t>
             </a:r>
             <a:r>
               <a:rPr lang="en-CA" dirty="0"/>
-              <a:t>, </a:t>
-            </a:r>
-            <a:r>
-              <a:rPr lang="en-CA" dirty="0" smtClean="0"/>
-              <a:t>PHP, CSS, JavaScript</a:t>
-            </a:r>
-            <a:r>
-              <a:rPr lang="en-CA" dirty="0"/>
-              <a:t>, </a:t>
-            </a:r>
-            <a:r>
-              <a:rPr lang="en-CA" dirty="0" smtClean="0"/>
-              <a:t>JQuery</a:t>
-            </a:r>
-            <a:r>
-              <a:rPr lang="en-CA" dirty="0"/>
-              <a:t>, </a:t>
-            </a:r>
-            <a:r>
-              <a:rPr lang="en-CA" dirty="0" smtClean="0"/>
-              <a:t>Angular</a:t>
-            </a:r>
-            <a:r>
-              <a:rPr lang="en-CA" dirty="0"/>
-              <a:t>, </a:t>
-            </a:r>
-            <a:r>
-              <a:rPr lang="en-CA" dirty="0" smtClean="0"/>
-              <a:t>HTML, </a:t>
-            </a:r>
-            <a:r>
-              <a:rPr lang="en-CA" dirty="0"/>
-              <a:t>	</a:t>
-            </a:r>
-            <a:r>
-              <a:rPr lang="en-CA" dirty="0" smtClean="0"/>
-              <a:t>Bootstrap</a:t>
-            </a:r>
-            <a:r>
-              <a:rPr lang="en-CA" dirty="0"/>
-              <a:t>, </a:t>
-            </a:r>
-            <a:r>
-              <a:rPr lang="en-CA" dirty="0" err="1" smtClean="0"/>
-              <a:t>Fullcalendar</a:t>
-            </a:r>
-            <a:r>
-              <a:rPr lang="en-CA" dirty="0" smtClean="0"/>
-              <a:t> </a:t>
-            </a:r>
-            <a:r>
-              <a:rPr lang="en-CA" dirty="0"/>
-              <a:t>plugin, desktop application(C#)</a:t>
+              <a:t> plugin, desktop application(C#)</a:t>
             </a:r>
           </a:p>
           <a:p>
@@ -6213,21 +6208,8 @@
           <a:p>
             <a:r>
               <a:rPr lang="en-CA" dirty="0"/>
-              <a:t>Through this project, finally obtained a clearer idea from the front end to back end </a:t>
-            </a:r>
-            <a:r>
-              <a:rPr lang="en-CA" dirty="0" smtClean="0"/>
-              <a:t>and </a:t>
-            </a:r>
-            <a:r>
-              <a:rPr lang="en-CA" dirty="0"/>
-              <a:t>connected some </a:t>
-            </a:r>
-            <a:r>
-              <a:rPr lang="en-CA" dirty="0" smtClean="0"/>
-              <a:t>dots</a:t>
-            </a:r>
-            <a:endParaRPr lang="en-CA" dirty="0"/>
+              <a:t>Through this project, finally obtained a clearer idea from the front end to back end and connected some dots.</a:t>
+            </a:r>
           </a:p>
           <a:p>
             <a:endParaRPr lang="en-CA" dirty="0"/>
@@ -6265,13 +6247,6 @@
       </p:transition>
     </mc:Fallback>
   </mc:AlternateContent>
-  <p:timing>
-    <p:tnLst>
-      <p:par>
-        <p:cTn id="1" dur="indefinite" restart="never" nodeType="tmRoot"/>
-      </p:par>
-    </p:tnLst>
-  </p:timing>
 </p:sld>
 </file>
 
@@ -6315,10 +6290,9 @@
           <a:lstStyle/>
           <a:p>
             <a:r>
-              <a:rPr lang="en-US" sz="4000" b="1" dirty="0" smtClean="0"/>
+              <a:rPr lang="en-US" sz="4000" b="1" dirty="0"/>
               <a:t>Solution overview</a:t>
             </a:r>
-            <a:endParaRPr lang="en-US" sz="4000" b="1" dirty="0"/>
           </a:p>
         </p:txBody>
       </p:sp>
@@ -6475,10 +6449,9 @@
               </a:spcAft>
             </a:pPr>
             <a:r>
-              <a:rPr lang="en-US" sz="2900" kern="1200" dirty="0" smtClean="0"/>
+              <a:rPr lang="en-US" sz="2900" kern="1200" dirty="0"/>
               <a:t>Database</a:t>
             </a:r>
-            <a:endParaRPr lang="en-US" sz="2900" kern="1200" dirty="0"/>
           </a:p>
         </p:txBody>
       </p:sp>
@@ -6802,10 +6775,9 @@
               </a:spcAft>
             </a:pPr>
             <a:r>
-              <a:rPr lang="en-US" sz="2900" kern="1200" dirty="0" smtClean="0"/>
+              <a:rPr lang="en-US" sz="2900" kern="1200" dirty="0"/>
               <a:t>Website</a:t>
             </a:r>
-            <a:endParaRPr lang="en-US" sz="2900" kern="1200" dirty="0"/>
           </a:p>
         </p:txBody>
       </p:sp>
@@ -7126,10 +7098,9 @@
               </a:spcAft>
             </a:pPr>
             <a:r>
-              <a:rPr lang="en-US" sz="2900" kern="1200" dirty="0" smtClean="0"/>
+              <a:rPr lang="en-US" sz="2900" kern="1200" dirty="0"/>
               <a:t>Desktop Application</a:t>
             </a:r>
-            <a:endParaRPr lang="en-US" sz="2900" kern="1200" dirty="0"/>
           </a:p>
         </p:txBody>
       </p:sp>
@@ -7346,7 +7317,7 @@
               <a:buChar char="•"/>
             </a:pPr>
             <a:r>
-              <a:rPr lang="en-US" sz="2400" dirty="0" smtClean="0"/>
+              <a:rPr lang="en-US" sz="2400" dirty="0"/>
               <a:t>Ordering</a:t>
             </a:r>
           </a:p>
@@ -7359,7 +7330,7 @@
               <a:buChar char="•"/>
             </a:pPr>
             <a:r>
-              <a:rPr lang="en-US" sz="2400" dirty="0" smtClean="0"/>
+              <a:rPr lang="en-US" sz="2400" dirty="0"/>
               <a:t>Invoicing</a:t>
             </a:r>
           </a:p>
@@ -7372,7 +7343,7 @@
               <a:buChar char="•"/>
             </a:pPr>
             <a:r>
-              <a:rPr lang="en-US" sz="2400" dirty="0" smtClean="0"/>
+              <a:rPr lang="en-US" sz="2400" dirty="0"/>
               <a:t>Payments</a:t>
             </a:r>
           </a:p>
@@ -7385,10 +7356,9 @@
               <a:buChar char="•"/>
             </a:pPr>
             <a:r>
-              <a:rPr lang="en-US" sz="2400" dirty="0" smtClean="0"/>
+              <a:rPr lang="en-US" sz="2400" dirty="0"/>
               <a:t>Scheduling</a:t>
             </a:r>
-            <a:endParaRPr lang="en-US" sz="2400" dirty="0"/>
           </a:p>
         </p:txBody>
       </p:sp>
@@ -7438,7 +7408,7 @@
               <a:buChar char="•"/>
             </a:pPr>
             <a:r>
-              <a:rPr lang="en-US" sz="2400" dirty="0" smtClean="0"/>
+              <a:rPr lang="en-US" sz="2400" dirty="0"/>
               <a:t>Presentation</a:t>
             </a:r>
           </a:p>
@@ -7451,7 +7421,7 @@
               <a:buChar char="•"/>
             </a:pPr>
             <a:r>
-              <a:rPr lang="en-US" sz="2400" dirty="0" smtClean="0"/>
+              <a:rPr lang="en-US" sz="2400" dirty="0"/>
               <a:t>Information</a:t>
             </a:r>
           </a:p>
@@ -7464,7 +7434,7 @@
               <a:buChar char="•"/>
             </a:pPr>
             <a:r>
-              <a:rPr lang="en-US" sz="2400" dirty="0" smtClean="0"/>
+              <a:rPr lang="en-US" sz="2400" dirty="0"/>
               <a:t>Preordering</a:t>
             </a:r>
           </a:p>
@@ -7477,7 +7447,7 @@
               <a:buChar char="•"/>
             </a:pPr>
             <a:r>
-              <a:rPr lang="en-US" sz="2400" dirty="0" smtClean="0"/>
+              <a:rPr lang="en-US" sz="2400" dirty="0"/>
               <a:t>Availability</a:t>
             </a:r>
           </a:p>
@@ -7700,7 +7670,7 @@
           <a:lstStyle/>
           <a:p>
             <a:r>
-              <a:rPr lang="en-CA" sz="4000" b="1" dirty="0" smtClean="0"/>
+              <a:rPr lang="en-CA" sz="4000" b="1" dirty="0"/>
               <a:t>Content structure</a:t>
             </a:r>
             <a:endParaRPr lang="en-US" sz="4000" b="1" dirty="0"/>
@@ -7775,13 +7745,9 @@
             <a:pPr algn="ctr"/>
             <a:r>
               <a:rPr lang="en-US" b="1" dirty="0" err="1"/>
-              <a:t>i</a:t>
-            </a:r>
-            <a:r>
-              <a:rPr lang="en-US" b="1" dirty="0" err="1" smtClean="0"/>
-              <a:t>ndex.php</a:t>
-            </a:r>
-            <a:endParaRPr lang="en-US" b="1" dirty="0" smtClean="0"/>
+              <a:t>index.php</a:t>
+            </a:r>
+            <a:endParaRPr lang="en-US" b="1" dirty="0"/>
           </a:p>
         </p:txBody>
       </p:sp>
@@ -7823,10 +7789,10 @@
           <a:p>
             <a:pPr algn="ctr"/>
             <a:r>
-              <a:rPr lang="en-US" b="1" dirty="0" err="1" smtClean="0"/>
+              <a:rPr lang="en-US" b="1" dirty="0" err="1"/>
               <a:t>indexen.php</a:t>
             </a:r>
-            <a:endParaRPr lang="en-US" b="1" dirty="0" smtClean="0"/>
+            <a:endParaRPr lang="en-US" b="1" dirty="0"/>
           </a:p>
         </p:txBody>
       </p:sp>
@@ -7872,11 +7838,7 @@
             <a:pPr algn="ctr"/>
             <a:r>
               <a:rPr lang="en-US" dirty="0"/>
-              <a:t>c</a:t>
-            </a:r>
-            <a:r>
-              <a:rPr lang="en-US" dirty="0" smtClean="0"/>
-              <a:t>ontent\</a:t>
+              <a:t>content\</a:t>
             </a:r>
           </a:p>
         </p:txBody>
@@ -7922,19 +7884,19 @@
           <a:p>
             <a:pPr algn="ctr"/>
             <a:r>
-              <a:rPr lang="en-US" dirty="0" smtClean="0"/>
+              <a:rPr lang="en-US" dirty="0"/>
               <a:t>content </a:t>
             </a:r>
             <a:r>
-              <a:rPr lang="en-US" b="1" dirty="0" smtClean="0"/>
+              <a:rPr lang="en-US" b="1" dirty="0"/>
               <a:t>\ </a:t>
             </a:r>
             <a:r>
-              <a:rPr lang="en-US" dirty="0" err="1" smtClean="0"/>
+              <a:rPr lang="en-US" dirty="0" err="1"/>
               <a:t>en</a:t>
             </a:r>
             <a:r>
-              <a:rPr lang="en-US" dirty="0" smtClean="0"/>
+              <a:rPr lang="en-US" dirty="0"/>
               <a:t>\</a:t>
             </a:r>
           </a:p>
@@ -7978,10 +7940,10 @@
           <a:p>
             <a:pPr algn="ctr"/>
             <a:r>
-              <a:rPr lang="en-US" dirty="0" err="1" smtClean="0"/>
+              <a:rPr lang="en-US" dirty="0" err="1"/>
               <a:t>home.php</a:t>
             </a:r>
-            <a:endParaRPr lang="en-US" dirty="0" smtClean="0"/>
+            <a:endParaRPr lang="en-US" dirty="0"/>
           </a:p>
         </p:txBody>
       </p:sp>
@@ -8023,10 +7985,10 @@
           <a:p>
             <a:pPr algn="ctr"/>
             <a:r>
-              <a:rPr lang="en-US" dirty="0" err="1" smtClean="0"/>
+              <a:rPr lang="en-US" dirty="0" err="1"/>
               <a:t>about.php</a:t>
             </a:r>
-            <a:endParaRPr lang="en-US" dirty="0" smtClean="0"/>
+            <a:endParaRPr lang="en-US" dirty="0"/>
           </a:p>
         </p:txBody>
       </p:sp>
@@ -8068,7 +8030,7 @@
           <a:p>
             <a:pPr algn="ctr"/>
             <a:r>
-              <a:rPr lang="en-US" dirty="0" smtClean="0"/>
+              <a:rPr lang="en-US" dirty="0"/>
               <a:t>…..</a:t>
             </a:r>
           </a:p>
@@ -8112,10 +8074,10 @@
           <a:p>
             <a:pPr algn="ctr"/>
             <a:r>
-              <a:rPr lang="en-US" dirty="0" err="1" smtClean="0"/>
+              <a:rPr lang="en-US" dirty="0" err="1"/>
               <a:t>home.php</a:t>
             </a:r>
-            <a:endParaRPr lang="en-US" dirty="0" smtClean="0"/>
+            <a:endParaRPr lang="en-US" dirty="0"/>
           </a:p>
         </p:txBody>
       </p:sp>
@@ -8157,10 +8119,10 @@
           <a:p>
             <a:pPr algn="ctr"/>
             <a:r>
-              <a:rPr lang="en-US" dirty="0" err="1" smtClean="0"/>
+              <a:rPr lang="en-US" dirty="0" err="1"/>
               <a:t>about.php</a:t>
             </a:r>
-            <a:endParaRPr lang="en-US" dirty="0" smtClean="0"/>
+            <a:endParaRPr lang="en-US" dirty="0"/>
           </a:p>
         </p:txBody>
       </p:sp>
@@ -8202,7 +8164,7 @@
           <a:p>
             <a:pPr algn="ctr"/>
             <a:r>
-              <a:rPr lang="en-US" dirty="0" smtClean="0"/>
+              <a:rPr lang="en-US" dirty="0"/>
               <a:t>…..</a:t>
             </a:r>
           </a:p>
@@ -8353,7 +8315,7 @@
           <a:p>
             <a:pPr algn="ctr"/>
             <a:r>
-              <a:rPr lang="en-US" b="1" dirty="0" smtClean="0"/>
+              <a:rPr lang="en-US" b="1" dirty="0"/>
               <a:t>EN</a:t>
             </a:r>
           </a:p>
@@ -8399,7 +8361,7 @@
           <a:p>
             <a:pPr algn="ctr"/>
             <a:r>
-              <a:rPr lang="en-US" b="1" dirty="0" smtClean="0"/>
+              <a:rPr lang="en-US" b="1" dirty="0"/>
               <a:t>FR</a:t>
             </a:r>
           </a:p>
@@ -8446,11 +8408,11 @@
           <a:p>
             <a:pPr algn="ctr"/>
             <a:r>
-              <a:rPr lang="en-US" dirty="0" err="1" smtClean="0"/>
+              <a:rPr lang="en-US" dirty="0" err="1"/>
               <a:t>css</a:t>
             </a:r>
             <a:r>
-              <a:rPr lang="en-US" dirty="0" smtClean="0"/>
+              <a:rPr lang="en-US" dirty="0"/>
               <a:t>\</a:t>
             </a:r>
           </a:p>
@@ -8494,10 +8456,10 @@
           <a:p>
             <a:pPr algn="ctr"/>
             <a:r>
-              <a:rPr lang="en-US" dirty="0" err="1" smtClean="0"/>
+              <a:rPr lang="en-US" dirty="0" err="1"/>
               <a:t>home.php</a:t>
             </a:r>
-            <a:endParaRPr lang="en-US" dirty="0" smtClean="0"/>
+            <a:endParaRPr lang="en-US" dirty="0"/>
           </a:p>
         </p:txBody>
       </p:sp>
@@ -8539,10 +8501,10 @@
           <a:p>
             <a:pPr algn="ctr"/>
             <a:r>
-              <a:rPr lang="en-US" dirty="0" err="1" smtClean="0"/>
+              <a:rPr lang="en-US" dirty="0" err="1"/>
               <a:t>about.php</a:t>
             </a:r>
-            <a:endParaRPr lang="en-US" dirty="0" smtClean="0"/>
+            <a:endParaRPr lang="en-US" dirty="0"/>
           </a:p>
         </p:txBody>
       </p:sp>
@@ -8584,7 +8546,7 @@
           <a:p>
             <a:pPr algn="ctr"/>
             <a:r>
-              <a:rPr lang="en-US" dirty="0" smtClean="0"/>
+              <a:rPr lang="en-US" dirty="0"/>
               <a:t>…..</a:t>
             </a:r>
           </a:p>
@@ -8800,7 +8762,7 @@
               <a:buFont typeface="Wingdings 2"/>
               <a:buNone/>
             </a:pPr>
-            <a:endParaRPr lang="en-CA" smtClean="0"/>
+            <a:endParaRPr lang="en-CA"/>
           </a:p>
           <a:p>
             <a:pPr>
@@ -8852,11 +8814,11 @@
           <a:p>
             <a:pPr algn="ctr"/>
             <a:r>
-              <a:rPr lang="en-US" dirty="0" err="1" smtClean="0"/>
+              <a:rPr lang="en-US" dirty="0" err="1"/>
               <a:t>js</a:t>
             </a:r>
             <a:r>
-              <a:rPr lang="en-US" dirty="0" smtClean="0"/>
+              <a:rPr lang="en-US" dirty="0"/>
               <a:t>\</a:t>
             </a:r>
           </a:p>
@@ -8900,10 +8862,10 @@
           <a:p>
             <a:pPr algn="ctr"/>
             <a:r>
-              <a:rPr lang="en-US" dirty="0" err="1" smtClean="0"/>
+              <a:rPr lang="en-US" dirty="0" err="1"/>
               <a:t>home.php</a:t>
             </a:r>
-            <a:endParaRPr lang="en-US" dirty="0" smtClean="0"/>
+            <a:endParaRPr lang="en-US" dirty="0"/>
           </a:p>
         </p:txBody>
       </p:sp>
@@ -8945,10 +8907,10 @@
           <a:p>
             <a:pPr algn="ctr"/>
             <a:r>
-              <a:rPr lang="en-US" dirty="0" err="1" smtClean="0"/>
+              <a:rPr lang="en-US" dirty="0" err="1"/>
               <a:t>about.php</a:t>
             </a:r>
-            <a:endParaRPr lang="en-US" dirty="0" smtClean="0"/>
+            <a:endParaRPr lang="en-US" dirty="0"/>
           </a:p>
         </p:txBody>
       </p:sp>
@@ -8990,7 +8952,7 @@
           <a:p>
             <a:pPr algn="ctr"/>
             <a:r>
-              <a:rPr lang="en-US" dirty="0" smtClean="0"/>
+              <a:rPr lang="en-US" dirty="0"/>
               <a:t>…..</a:t>
             </a:r>
           </a:p>
@@ -9037,7 +8999,7 @@
           <a:p>
             <a:pPr algn="ctr"/>
             <a:r>
-              <a:rPr lang="en-US" dirty="0" smtClean="0"/>
+              <a:rPr lang="en-US" dirty="0"/>
               <a:t>functions\</a:t>
             </a:r>
           </a:p>
@@ -9084,7 +9046,7 @@
           <a:p>
             <a:pPr algn="ctr"/>
             <a:r>
-              <a:rPr lang="en-US" dirty="0" smtClean="0"/>
+              <a:rPr lang="en-US" dirty="0"/>
               <a:t>fonts\</a:t>
             </a:r>
           </a:p>
@@ -9131,7 +9093,7 @@
           <a:p>
             <a:pPr algn="ctr"/>
             <a:r>
-              <a:rPr lang="en-US" dirty="0" smtClean="0"/>
+              <a:rPr lang="en-US" dirty="0"/>
               <a:t>images\</a:t>
             </a:r>
           </a:p>
@@ -9248,7 +9210,7 @@
           <a:p>
             <a:pPr algn="ctr"/>
             <a:r>
-              <a:rPr lang="en-US" dirty="0" smtClean="0"/>
+              <a:rPr lang="en-US" dirty="0"/>
               <a:t>……..</a:t>
             </a:r>
           </a:p>
@@ -9292,7 +9254,7 @@
           <a:p>
             <a:pPr algn="ctr"/>
             <a:r>
-              <a:rPr lang="en-US" dirty="0" smtClean="0"/>
+              <a:rPr lang="en-US" dirty="0"/>
               <a:t>…..</a:t>
             </a:r>
           </a:p>
@@ -9336,7 +9298,7 @@
           <a:p>
             <a:pPr algn="ctr"/>
             <a:r>
-              <a:rPr lang="en-US" dirty="0" smtClean="0"/>
+              <a:rPr lang="en-US" dirty="0"/>
               <a:t>…..</a:t>
             </a:r>
           </a:p>
@@ -9380,7 +9342,7 @@
           <a:p>
             <a:pPr algn="ctr"/>
             <a:r>
-              <a:rPr lang="en-US" dirty="0" smtClean="0"/>
+              <a:rPr lang="en-US" dirty="0"/>
               <a:t>…..</a:t>
             </a:r>
           </a:p>
@@ -9424,7 +9386,7 @@
           <a:p>
             <a:pPr algn="ctr"/>
             <a:r>
-              <a:rPr lang="en-US" dirty="0" smtClean="0"/>
+              <a:rPr lang="en-US" dirty="0"/>
               <a:t>…..</a:t>
             </a:r>
           </a:p>
@@ -10756,11 +10718,7 @@
           <a:p>
             <a:r>
               <a:rPr lang="en-CA" sz="4000" b="1" dirty="0"/>
-              <a:t>Content </a:t>
-            </a:r>
-            <a:r>
-              <a:rPr lang="en-CA" sz="4000" b="1" dirty="0" smtClean="0"/>
-              <a:t>management</a:t>
+              <a:t>Content management</a:t>
             </a:r>
             <a:endParaRPr lang="en-CA" sz="4000" dirty="0"/>
           </a:p>
@@ -11018,11 +10976,11 @@
           <a:lstStyle/>
           <a:p>
             <a:r>
-              <a:rPr lang="en-US" b="1" dirty="0" smtClean="0"/>
+              <a:rPr lang="en-US" b="1" dirty="0"/>
               <a:t>Only link format:   </a:t>
             </a:r>
             <a:r>
-              <a:rPr lang="en-US" dirty="0" err="1" smtClean="0">
+              <a:rPr lang="en-US" dirty="0" err="1">
                 <a:solidFill>
                   <a:srgbClr val="002060"/>
                 </a:solidFill>
@@ -11030,7 +10988,7 @@
               <a:t>index.php?content</a:t>
             </a:r>
             <a:r>
-              <a:rPr lang="en-US" dirty="0" smtClean="0">
+              <a:rPr lang="en-US" dirty="0">
                 <a:solidFill>
                   <a:srgbClr val="002060"/>
                 </a:solidFill>
@@ -11038,7 +10996,7 @@
               <a:t>=</a:t>
             </a:r>
             <a:r>
-              <a:rPr lang="en-US" dirty="0" err="1" smtClean="0">
+              <a:rPr lang="en-US" dirty="0" err="1">
                 <a:solidFill>
                   <a:srgbClr val="002060"/>
                 </a:solidFill>
@@ -11046,7 +11004,7 @@
               <a:t>page_name</a:t>
             </a:r>
             <a:r>
-              <a:rPr lang="en-US" dirty="0" smtClean="0">
+              <a:rPr lang="en-US" dirty="0">
                 <a:solidFill>
                   <a:srgbClr val="002060"/>
                 </a:solidFill>
@@ -11054,7 +11012,7 @@
               <a:t>   OR    </a:t>
             </a:r>
             <a:r>
-              <a:rPr lang="en-US" dirty="0" err="1" smtClean="0">
+              <a:rPr lang="en-US" dirty="0" err="1">
                 <a:solidFill>
                   <a:srgbClr val="002060"/>
                 </a:solidFill>
@@ -11062,7 +11020,7 @@
               <a:t>indexen.php?content</a:t>
             </a:r>
             <a:r>
-              <a:rPr lang="en-US" dirty="0" smtClean="0">
+              <a:rPr lang="en-US" dirty="0">
                 <a:solidFill>
                   <a:srgbClr val="002060"/>
                 </a:solidFill>
@@ -11070,14 +11028,14 @@
               <a:t>=</a:t>
             </a:r>
             <a:r>
-              <a:rPr lang="en-US" dirty="0" err="1" smtClean="0">
+              <a:rPr lang="en-US" dirty="0" err="1">
                 <a:solidFill>
                   <a:srgbClr val="002060"/>
                 </a:solidFill>
               </a:rPr>
               <a:t>page_name</a:t>
             </a:r>
-            <a:endParaRPr lang="en-US" dirty="0" smtClean="0">
+            <a:endParaRPr lang="en-US" dirty="0">
               <a:solidFill>
                 <a:srgbClr val="002060"/>
               </a:solidFill>
@@ -11137,10 +11095,10 @@
           <a:lstStyle/>
           <a:p>
             <a:r>
-              <a:rPr lang="en-US" sz="1400" b="1" dirty="0" smtClean="0"/>
+              <a:rPr lang="en-US" sz="1400" b="1" dirty="0"/>
               <a:t>function returns ARRAY of PHP files (styles, scripts)</a:t>
             </a:r>
-            <a:endParaRPr lang="en-US" sz="1400" dirty="0" smtClean="0">
+            <a:endParaRPr lang="en-US" sz="1400" dirty="0">
               <a:solidFill>
                 <a:srgbClr val="002060"/>
               </a:solidFill>
@@ -11224,7 +11182,7 @@
           <a:lstStyle/>
           <a:p>
             <a:r>
-              <a:rPr lang="en-US" sz="2000" b="1" dirty="0" smtClean="0">
+              <a:rPr lang="en-US" sz="2000" b="1" dirty="0">
                 <a:solidFill>
                   <a:schemeClr val="accent1">
                     <a:lumMod val="75000"/>
@@ -11264,7 +11222,7 @@
           <a:lstStyle/>
           <a:p>
             <a:r>
-              <a:rPr lang="en-US" sz="2000" b="1" dirty="0" smtClean="0">
+              <a:rPr lang="en-US" sz="2000" b="1" dirty="0">
                 <a:solidFill>
                   <a:schemeClr val="accent1">
                     <a:lumMod val="75000"/>
@@ -11304,7 +11262,7 @@
           <a:lstStyle/>
           <a:p>
             <a:r>
-              <a:rPr lang="en-US" sz="2000" b="1" dirty="0" smtClean="0">
+              <a:rPr lang="en-US" sz="2000" b="1" dirty="0">
                 <a:solidFill>
                   <a:schemeClr val="accent1">
                     <a:lumMod val="75000"/>
@@ -11314,7 +11272,7 @@
               <a:t>&lt;</a:t>
             </a:r>
             <a:r>
-              <a:rPr lang="en-US" sz="2000" b="1" dirty="0" err="1" smtClean="0">
+              <a:rPr lang="en-US" sz="2000" b="1" dirty="0" err="1">
                 <a:solidFill>
                   <a:schemeClr val="accent1">
                     <a:lumMod val="75000"/>
@@ -11324,7 +11282,7 @@
               <a:t>nav</a:t>
             </a:r>
             <a:r>
-              <a:rPr lang="en-US" sz="2000" b="1" dirty="0" smtClean="0">
+              <a:rPr lang="en-US" sz="2000" b="1" dirty="0">
                 <a:solidFill>
                   <a:schemeClr val="accent1">
                     <a:lumMod val="75000"/>
@@ -12150,10 +12108,9 @@
           <a:lstStyle/>
           <a:p>
             <a:r>
-              <a:rPr lang="en-CA" sz="4000" b="1" dirty="0" smtClean="0"/>
+              <a:rPr lang="en-CA" sz="4000" b="1" dirty="0"/>
               <a:t>Responsive design</a:t>
             </a:r>
-            <a:endParaRPr lang="en-CA" sz="4000" b="1" dirty="0"/>
           </a:p>
         </p:txBody>
       </p:sp>
@@ -12348,7 +12305,7 @@
           <a:lstStyle/>
           <a:p>
             <a:r>
-              <a:rPr lang="en-CA" sz="4000" b="1" dirty="0" smtClean="0"/>
+              <a:rPr lang="en-CA" sz="4000" b="1" dirty="0"/>
               <a:t>Problems solved</a:t>
             </a:r>
             <a:r>
@@ -12409,13 +12366,13 @@
           <a:lstStyle/>
           <a:p>
             <a:r>
-              <a:rPr lang="en-US" b="1" dirty="0" smtClean="0">
+              <a:rPr lang="en-US" b="1" dirty="0">
                 <a:sym typeface="Wingdings" panose="05000000000000000000" pitchFamily="2" charset="2"/>
               </a:rPr>
               <a:t> </a:t>
             </a:r>
             <a:r>
-              <a:rPr lang="en-US" b="1" dirty="0" smtClean="0"/>
+              <a:rPr lang="en-US" b="1" dirty="0"/>
               <a:t>Provide information</a:t>
             </a:r>
           </a:p>
@@ -12447,13 +12404,13 @@
           <a:lstStyle/>
           <a:p>
             <a:r>
-              <a:rPr lang="en-US" b="1" dirty="0" smtClean="0">
+              <a:rPr lang="en-US" b="1" dirty="0">
                 <a:sym typeface="Wingdings" panose="05000000000000000000" pitchFamily="2" charset="2"/>
               </a:rPr>
               <a:t> </a:t>
             </a:r>
             <a:r>
-              <a:rPr lang="en-US" b="1" dirty="0" smtClean="0"/>
+              <a:rPr lang="en-US" b="1" dirty="0"/>
               <a:t>Interacting with desktop application</a:t>
             </a:r>
           </a:p>
@@ -12509,7 +12466,7 @@
           <a:lstStyle/>
           <a:p>
             <a:r>
-              <a:rPr lang="en-US" sz="1600" b="1" dirty="0" smtClean="0"/>
+              <a:rPr lang="en-US" sz="1600" b="1" dirty="0"/>
               <a:t>Processing estimation requests</a:t>
             </a:r>
           </a:p>
@@ -12565,7 +12522,7 @@
           <a:lstStyle/>
           <a:p>
             <a:r>
-              <a:rPr lang="en-US" sz="1600" b="1" dirty="0" smtClean="0"/>
+              <a:rPr lang="en-US" sz="1600" b="1" dirty="0"/>
               <a:t>Update prices</a:t>
             </a:r>
           </a:p>
@@ -12895,7 +12852,7 @@
           <a:lstStyle/>
           <a:p>
             <a:r>
-              <a:rPr lang="en-CA" sz="4000" b="1" dirty="0" smtClean="0"/>
+              <a:rPr lang="en-CA" sz="4000" b="1" dirty="0"/>
               <a:t>Estimation request – form processing</a:t>
             </a:r>
             <a:endParaRPr lang="en-US" sz="4000" b="1" dirty="0"/>
@@ -12998,13 +12955,6 @@
       </p:transition>
     </mc:Fallback>
   </mc:AlternateContent>
-  <p:timing>
-    <p:tnLst>
-      <p:par>
-        <p:cTn id="1" dur="indefinite" restart="never" nodeType="tmRoot"/>
-      </p:par>
-    </p:tnLst>
-  </p:timing>
 </p:sld>
 </file>
 
@@ -13055,23 +13005,7 @@
           <a:p>
             <a:r>
               <a:rPr lang="en-CA" sz="4000" b="1" dirty="0"/>
-              <a:t>Form </a:t>
-            </a:r>
-            <a:r>
-              <a:rPr lang="en-CA" sz="4000" b="1" dirty="0" smtClean="0"/>
-              <a:t>validation - client </a:t>
-            </a:r>
-            <a:r>
-              <a:rPr lang="en-CA" sz="4000" b="1" dirty="0"/>
-              <a:t>side </a:t>
-            </a:r>
-            <a:r>
-              <a:rPr lang="en-CA" sz="4000" b="1" dirty="0" smtClean="0"/>
-              <a:t>/ </a:t>
-            </a:r>
-            <a:r>
-              <a:rPr lang="en-CA" sz="4000" b="1" dirty="0"/>
-              <a:t>server side</a:t>
+              <a:t>Form validation - client side / server side</a:t>
             </a:r>
           </a:p>
         </p:txBody>
@@ -13221,73 +13155,8 @@
                 <a:ea typeface="+mn-ea"/>
                 <a:cs typeface="+mn-cs"/>
               </a:rPr>
-              <a:t>If there are data to be corrected, whatever user entered will stay, so user just need to correct fields where need to be corrected. To do this, have add below </a:t>
-            </a:r>
-            <a:r>
-              <a:rPr kumimoji="0" lang="en-CA" sz="1800" b="0" i="0" u="none" strike="noStrike" kern="1200" cap="none" spc="0" normalizeH="0" baseline="0" noProof="0" dirty="0" smtClean="0">
-                <a:ln>
-                  <a:noFill/>
-                </a:ln>
-                <a:solidFill>
-                  <a:prstClr val="black"/>
-                </a:solidFill>
-                <a:effectLst/>
-                <a:uLnTx/>
-                <a:uFillTx/>
-                <a:latin typeface="Palatino Linotype" panose="02040502050505030304"/>
-                <a:ea typeface="+mn-ea"/>
-                <a:cs typeface="+mn-cs"/>
-              </a:rPr>
-              <a:t>PHP </a:t>
-            </a:r>
-            <a:r>
-              <a:rPr kumimoji="0" lang="en-CA" sz="1800" b="0" i="0" u="none" strike="noStrike" kern="1200" cap="none" spc="0" normalizeH="0" baseline="0" noProof="0" dirty="0">
-                <a:ln>
-                  <a:noFill/>
-                </a:ln>
-                <a:solidFill>
-                  <a:prstClr val="black"/>
-                </a:solidFill>
-                <a:effectLst/>
-                <a:uLnTx/>
-                <a:uFillTx/>
-                <a:latin typeface="Palatino Linotype" panose="02040502050505030304"/>
-                <a:ea typeface="+mn-ea"/>
-                <a:cs typeface="+mn-cs"/>
-              </a:rPr>
-              <a:t>code into </a:t>
-            </a:r>
-            <a:r>
-              <a:rPr kumimoji="0" lang="en-CA" sz="1800" b="0" i="0" u="none" strike="noStrike" kern="1200" cap="none" spc="0" normalizeH="0" baseline="0" noProof="0" dirty="0" smtClean="0">
-                <a:ln>
-                  <a:noFill/>
-                </a:ln>
-                <a:solidFill>
-                  <a:prstClr val="black"/>
-                </a:solidFill>
-                <a:effectLst/>
-                <a:uLnTx/>
-                <a:uFillTx/>
-                <a:latin typeface="Palatino Linotype" panose="02040502050505030304"/>
-                <a:ea typeface="+mn-ea"/>
-                <a:cs typeface="+mn-cs"/>
-              </a:rPr>
-              <a:t>HTML tag</a:t>
-            </a:r>
-            <a:endParaRPr kumimoji="0" lang="en-CA" sz="1800" b="0" i="0" u="none" strike="noStrike" kern="1200" cap="none" spc="0" normalizeH="0" baseline="0" noProof="0" dirty="0">
-              <a:ln>
-                <a:noFill/>
-              </a:ln>
-              <a:solidFill>
-                <a:prstClr val="black"/>
-              </a:solidFill>
-              <a:effectLst/>
-              <a:uLnTx/>
-              <a:uFillTx/>
-              <a:latin typeface="Palatino Linotype" panose="02040502050505030304"/>
-              <a:ea typeface="+mn-ea"/>
-              <a:cs typeface="+mn-cs"/>
-            </a:endParaRPr>
+              <a:t>If there are data to be corrected, whatever user entered will stay, so user just need to correct fields where need to be corrected. To do this, have add below PHP code into HTML tag</a:t>
+            </a:r>
           </a:p>
         </p:txBody>
       </p:sp>
@@ -13353,13 +13222,6 @@
       </p:transition>
     </mc:Fallback>
   </mc:AlternateContent>
-  <p:timing>
-    <p:tnLst>
-      <p:par>
-        <p:cTn id="1" dur="indefinite" restart="never" nodeType="tmRoot"/>
-      </p:par>
-    </p:tnLst>
-  </p:timing>
 </p:sld>
 </file>
 
@@ -13409,18 +13271,9 @@
           <a:lstStyle/>
           <a:p>
             <a:r>
-              <a:rPr lang="en-CA" sz="4000" b="1" dirty="0" smtClean="0"/>
-              <a:t>Saving into </a:t>
-            </a:r>
-            <a:r>
               <a:rPr lang="en-CA" sz="4000" b="1" dirty="0"/>
-              <a:t>database </a:t>
-            </a:r>
-            <a:r>
-              <a:rPr lang="en-CA" sz="4000" b="1" dirty="0" smtClean="0"/>
-              <a:t>and validations</a:t>
-            </a:r>
-            <a:endParaRPr lang="en-CA" sz="4000" b="1" dirty="0"/>
+              <a:t>Saving into database and validations</a:t>
+            </a:r>
           </a:p>
         </p:txBody>
       </p:sp>
@@ -13487,13 +13340,6 @@
       </p:transition>
     </mc:Fallback>
   </mc:AlternateContent>
-  <p:timing>
-    <p:tnLst>
-      <p:par>
-        <p:cTn id="1" dur="indefinite" restart="never" nodeType="tmRoot"/>
-      </p:par>
-    </p:tnLst>
-  </p:timing>
 </p:sld>
 </file>
 

</xml_diff>